<commit_message>
Updated k-means based k-NN
</commit_message>
<xml_diff>
--- a/Recommendation System using PySpark.pptx
+++ b/Recommendation System using PySpark.pptx
@@ -7,7 +7,13 @@
   <p:sldIdLst>
     <p:sldId id="256" r:id="rId2"/>
     <p:sldId id="257" r:id="rId3"/>
-    <p:sldId id="258" r:id="rId4"/>
+    <p:sldId id="262" r:id="rId4"/>
+    <p:sldId id="263" r:id="rId5"/>
+    <p:sldId id="264" r:id="rId6"/>
+    <p:sldId id="258" r:id="rId7"/>
+    <p:sldId id="259" r:id="rId8"/>
+    <p:sldId id="260" r:id="rId9"/>
+    <p:sldId id="261" r:id="rId10"/>
   </p:sldIdLst>
   <p:sldSz cx="12192000" cy="6858000"/>
   <p:notesSz cx="6858000" cy="9144000"/>
@@ -106,6 +112,40 @@
       </a:defRPr>
     </a:lvl9pPr>
   </p:defaultTextStyle>
+  <p:extLst>
+    <p:ext uri="{521415D9-36F7-43E2-AB2F-B90AF26B5E84}">
+      <p14:sectionLst xmlns:p14="http://schemas.microsoft.com/office/powerpoint/2010/main">
+        <p14:section name="Introduction" id="{789601D9-864F-406A-A430-4FFA463EF572}">
+          <p14:sldIdLst>
+            <p14:sldId id="256"/>
+            <p14:sldId id="257"/>
+          </p14:sldIdLst>
+        </p14:section>
+        <p14:section name="Data Exploration" id="{176F455A-2844-4E3D-A7AF-2F831A600495}">
+          <p14:sldIdLst>
+            <p14:sldId id="262"/>
+            <p14:sldId id="263"/>
+            <p14:sldId id="264"/>
+            <p14:sldId id="258"/>
+          </p14:sldIdLst>
+        </p14:section>
+        <p14:section name="kNN" id="{FB6914D1-F35F-4002-97EF-85B07C373172}">
+          <p14:sldIdLst>
+            <p14:sldId id="259"/>
+            <p14:sldId id="260"/>
+          </p14:sldIdLst>
+        </p14:section>
+        <p14:section name="Latent factor" id="{FCE71258-04B7-4F0A-9F16-CD462DD42AF3}">
+          <p14:sldIdLst>
+            <p14:sldId id="261"/>
+          </p14:sldIdLst>
+        </p14:section>
+      </p14:sectionLst>
+    </p:ext>
+    <p:ext uri="{EFAFB233-063F-42B5-8137-9DF3F51BA10A}">
+      <p15:sldGuideLst xmlns:p15="http://schemas.microsoft.com/office/powerpoint/2012/main"/>
+    </p:ext>
+  </p:extLst>
 </p:presentation>
 </file>
 
@@ -258,7 +298,7 @@
           <a:p>
             <a:fld id="{0A5EFA97-170D-4EA7-B776-04BBB0F23610}" type="datetimeFigureOut">
               <a:rPr lang="en-IN" smtClean="0"/>
-              <a:t>25-04-2025</a:t>
+              <a:t>03-05-2025</a:t>
             </a:fld>
             <a:endParaRPr lang="en-IN"/>
           </a:p>
@@ -458,7 +498,7 @@
           <a:p>
             <a:fld id="{0A5EFA97-170D-4EA7-B776-04BBB0F23610}" type="datetimeFigureOut">
               <a:rPr lang="en-IN" smtClean="0"/>
-              <a:t>25-04-2025</a:t>
+              <a:t>03-05-2025</a:t>
             </a:fld>
             <a:endParaRPr lang="en-IN"/>
           </a:p>
@@ -668,7 +708,7 @@
           <a:p>
             <a:fld id="{0A5EFA97-170D-4EA7-B776-04BBB0F23610}" type="datetimeFigureOut">
               <a:rPr lang="en-IN" smtClean="0"/>
-              <a:t>25-04-2025</a:t>
+              <a:t>03-05-2025</a:t>
             </a:fld>
             <a:endParaRPr lang="en-IN"/>
           </a:p>
@@ -868,7 +908,7 @@
           <a:p>
             <a:fld id="{0A5EFA97-170D-4EA7-B776-04BBB0F23610}" type="datetimeFigureOut">
               <a:rPr lang="en-IN" smtClean="0"/>
-              <a:t>25-04-2025</a:t>
+              <a:t>03-05-2025</a:t>
             </a:fld>
             <a:endParaRPr lang="en-IN"/>
           </a:p>
@@ -1144,7 +1184,7 @@
           <a:p>
             <a:fld id="{0A5EFA97-170D-4EA7-B776-04BBB0F23610}" type="datetimeFigureOut">
               <a:rPr lang="en-IN" smtClean="0"/>
-              <a:t>25-04-2025</a:t>
+              <a:t>03-05-2025</a:t>
             </a:fld>
             <a:endParaRPr lang="en-IN"/>
           </a:p>
@@ -1412,7 +1452,7 @@
           <a:p>
             <a:fld id="{0A5EFA97-170D-4EA7-B776-04BBB0F23610}" type="datetimeFigureOut">
               <a:rPr lang="en-IN" smtClean="0"/>
-              <a:t>25-04-2025</a:t>
+              <a:t>03-05-2025</a:t>
             </a:fld>
             <a:endParaRPr lang="en-IN"/>
           </a:p>
@@ -1827,7 +1867,7 @@
           <a:p>
             <a:fld id="{0A5EFA97-170D-4EA7-B776-04BBB0F23610}" type="datetimeFigureOut">
               <a:rPr lang="en-IN" smtClean="0"/>
-              <a:t>25-04-2025</a:t>
+              <a:t>03-05-2025</a:t>
             </a:fld>
             <a:endParaRPr lang="en-IN"/>
           </a:p>
@@ -1969,7 +2009,7 @@
           <a:p>
             <a:fld id="{0A5EFA97-170D-4EA7-B776-04BBB0F23610}" type="datetimeFigureOut">
               <a:rPr lang="en-IN" smtClean="0"/>
-              <a:t>25-04-2025</a:t>
+              <a:t>03-05-2025</a:t>
             </a:fld>
             <a:endParaRPr lang="en-IN"/>
           </a:p>
@@ -2082,7 +2122,7 @@
           <a:p>
             <a:fld id="{0A5EFA97-170D-4EA7-B776-04BBB0F23610}" type="datetimeFigureOut">
               <a:rPr lang="en-IN" smtClean="0"/>
-              <a:t>25-04-2025</a:t>
+              <a:t>03-05-2025</a:t>
             </a:fld>
             <a:endParaRPr lang="en-IN"/>
           </a:p>
@@ -2395,7 +2435,7 @@
           <a:p>
             <a:fld id="{0A5EFA97-170D-4EA7-B776-04BBB0F23610}" type="datetimeFigureOut">
               <a:rPr lang="en-IN" smtClean="0"/>
-              <a:t>25-04-2025</a:t>
+              <a:t>03-05-2025</a:t>
             </a:fld>
             <a:endParaRPr lang="en-IN"/>
           </a:p>
@@ -2684,7 +2724,7 @@
           <a:p>
             <a:fld id="{0A5EFA97-170D-4EA7-B776-04BBB0F23610}" type="datetimeFigureOut">
               <a:rPr lang="en-IN" smtClean="0"/>
-              <a:t>25-04-2025</a:t>
+              <a:t>03-05-2025</a:t>
             </a:fld>
             <a:endParaRPr lang="en-IN"/>
           </a:p>
@@ -2927,7 +2967,7 @@
           <a:p>
             <a:fld id="{0A5EFA97-170D-4EA7-B776-04BBB0F23610}" type="datetimeFigureOut">
               <a:rPr lang="en-IN" smtClean="0"/>
-              <a:t>25-04-2025</a:t>
+              <a:t>03-05-2025</a:t>
             </a:fld>
             <a:endParaRPr lang="en-IN"/>
           </a:p>
@@ -3492,7 +3532,7 @@
             <a:pPr lvl="1"/>
             <a:r>
               <a:rPr lang="en-IN" dirty="0"/>
-              <a:t>Suggest content based on the user preferences</a:t>
+              <a:t>User past history</a:t>
             </a:r>
           </a:p>
           <a:p>
@@ -3505,7 +3545,20 @@
             <a:pPr lvl="1"/>
             <a:r>
               <a:rPr lang="en-US" dirty="0"/>
-              <a:t>Suggest content by comparing different users</a:t>
+              <a:t>User-user comparison</a:t>
+            </a:r>
+          </a:p>
+          <a:p>
+            <a:pPr lvl="1"/>
+            <a:r>
+              <a:rPr lang="en-US" dirty="0"/>
+              <a:t>Movie-movie comparison</a:t>
+            </a:r>
+          </a:p>
+          <a:p>
+            <a:r>
+              <a:rPr lang="en-US" dirty="0"/>
+              <a:t>Latent factor methods</a:t>
             </a:r>
           </a:p>
         </p:txBody>
@@ -3542,6 +3595,807 @@
       </p:grpSpPr>
       <p:sp>
         <p:nvSpPr>
+          <p:cNvPr id="4" name="Title 3">
+            <a:extLst>
+              <a:ext uri="{FF2B5EF4-FFF2-40B4-BE49-F238E27FC236}">
+                <a16:creationId xmlns:a16="http://schemas.microsoft.com/office/drawing/2014/main" id="{5A78185F-DBFB-EC59-B542-516C71AE83C9}"/>
+              </a:ext>
+            </a:extLst>
+          </p:cNvPr>
+          <p:cNvSpPr>
+            <a:spLocks noGrp="1"/>
+          </p:cNvSpPr>
+          <p:nvPr>
+            <p:ph type="title"/>
+          </p:nvPr>
+        </p:nvSpPr>
+        <p:spPr/>
+        <p:txBody>
+          <a:bodyPr/>
+          <a:lstStyle/>
+          <a:p>
+            <a:r>
+              <a:rPr lang="en-US" dirty="0"/>
+              <a:t>Data Split – Time based or Random?</a:t>
+            </a:r>
+            <a:endParaRPr lang="en-IN" dirty="0"/>
+          </a:p>
+        </p:txBody>
+      </p:sp>
+      <p:sp>
+        <p:nvSpPr>
+          <p:cNvPr id="5" name="Content Placeholder 4">
+            <a:extLst>
+              <a:ext uri="{FF2B5EF4-FFF2-40B4-BE49-F238E27FC236}">
+                <a16:creationId xmlns:a16="http://schemas.microsoft.com/office/drawing/2014/main" id="{66F30568-05A8-A668-1726-F1C96855DEA8}"/>
+              </a:ext>
+            </a:extLst>
+          </p:cNvPr>
+          <p:cNvSpPr>
+            <a:spLocks noGrp="1"/>
+          </p:cNvSpPr>
+          <p:nvPr>
+            <p:ph sz="half" idx="1"/>
+          </p:nvPr>
+        </p:nvSpPr>
+        <p:spPr/>
+        <p:txBody>
+          <a:bodyPr/>
+          <a:lstStyle/>
+          <a:p>
+            <a:r>
+              <a:rPr lang="en-US" dirty="0"/>
+              <a:t>Average rating per year</a:t>
+            </a:r>
+          </a:p>
+          <a:p>
+            <a:pPr lvl="1"/>
+            <a:r>
+              <a:rPr lang="en-US" dirty="0"/>
+              <a:t>Mean: 3.55</a:t>
+            </a:r>
+          </a:p>
+          <a:p>
+            <a:pPr lvl="1"/>
+            <a:r>
+              <a:rPr lang="en-US" dirty="0"/>
+              <a:t>Median: 3.548</a:t>
+            </a:r>
+          </a:p>
+          <a:p>
+            <a:pPr lvl="1"/>
+            <a:r>
+              <a:rPr lang="en-IN" dirty="0"/>
+              <a:t>Standard deviation: 0.067</a:t>
+            </a:r>
+          </a:p>
+          <a:p>
+            <a:pPr lvl="1"/>
+            <a:r>
+              <a:rPr lang="en-IN" dirty="0"/>
+              <a:t>Min rating: 3.43</a:t>
+            </a:r>
+          </a:p>
+          <a:p>
+            <a:pPr lvl="1"/>
+            <a:r>
+              <a:rPr lang="en-IN" dirty="0"/>
+              <a:t>Max rating: 3.75</a:t>
+            </a:r>
+          </a:p>
+          <a:p>
+            <a:r>
+              <a:rPr lang="en-IN" dirty="0"/>
+              <a:t>Independent of time</a:t>
+            </a:r>
+          </a:p>
+          <a:p>
+            <a:r>
+              <a:rPr lang="en-IN" dirty="0"/>
+              <a:t>Random split is fine</a:t>
+            </a:r>
+          </a:p>
+          <a:p>
+            <a:endParaRPr lang="en-IN" dirty="0"/>
+          </a:p>
+        </p:txBody>
+      </p:sp>
+      <p:pic>
+        <p:nvPicPr>
+          <p:cNvPr id="8" name="Content Placeholder 7">
+            <a:extLst>
+              <a:ext uri="{FF2B5EF4-FFF2-40B4-BE49-F238E27FC236}">
+                <a16:creationId xmlns:a16="http://schemas.microsoft.com/office/drawing/2014/main" id="{C88563AC-4C4D-EAE1-2DB4-0E3146BB2EE9}"/>
+              </a:ext>
+            </a:extLst>
+          </p:cNvPr>
+          <p:cNvPicPr>
+            <a:picLocks noGrp="1" noChangeAspect="1"/>
+          </p:cNvPicPr>
+          <p:nvPr>
+            <p:ph sz="half" idx="2"/>
+          </p:nvPr>
+        </p:nvPicPr>
+        <p:blipFill>
+          <a:blip r:embed="rId2"/>
+          <a:stretch>
+            <a:fillRect/>
+          </a:stretch>
+        </p:blipFill>
+        <p:spPr>
+          <a:xfrm>
+            <a:off x="6262809" y="1825625"/>
+            <a:ext cx="5000382" cy="4351338"/>
+          </a:xfrm>
+        </p:spPr>
+      </p:pic>
+    </p:spTree>
+    <p:extLst>
+      <p:ext uri="{BB962C8B-B14F-4D97-AF65-F5344CB8AC3E}">
+        <p14:creationId xmlns:p14="http://schemas.microsoft.com/office/powerpoint/2010/main" val="3964009250"/>
+      </p:ext>
+    </p:extLst>
+  </p:cSld>
+  <p:clrMapOvr>
+    <a:masterClrMapping/>
+  </p:clrMapOvr>
+</p:sld>
+</file>
+
+<file path=ppt/slides/slide4.xml><?xml version="1.0" encoding="utf-8"?>
+<p:sld xmlns:a="http://schemas.openxmlformats.org/drawingml/2006/main" xmlns:r="http://schemas.openxmlformats.org/officeDocument/2006/relationships" xmlns:p="http://schemas.openxmlformats.org/presentationml/2006/main">
+  <p:cSld>
+    <p:spTree>
+      <p:nvGrpSpPr>
+        <p:cNvPr id="1" name=""/>
+        <p:cNvGrpSpPr/>
+        <p:nvPr/>
+      </p:nvGrpSpPr>
+      <p:grpSpPr>
+        <a:xfrm>
+          <a:off x="0" y="0"/>
+          <a:ext cx="0" cy="0"/>
+          <a:chOff x="0" y="0"/>
+          <a:chExt cx="0" cy="0"/>
+        </a:xfrm>
+      </p:grpSpPr>
+      <p:sp>
+        <p:nvSpPr>
+          <p:cNvPr id="2" name="Title 1">
+            <a:extLst>
+              <a:ext uri="{FF2B5EF4-FFF2-40B4-BE49-F238E27FC236}">
+                <a16:creationId xmlns:a16="http://schemas.microsoft.com/office/drawing/2014/main" id="{015B6AC9-F6EE-B9BA-F44F-5072A6C5C4EE}"/>
+              </a:ext>
+            </a:extLst>
+          </p:cNvPr>
+          <p:cNvSpPr>
+            <a:spLocks noGrp="1"/>
+          </p:cNvSpPr>
+          <p:nvPr>
+            <p:ph type="title"/>
+          </p:nvPr>
+        </p:nvSpPr>
+        <p:spPr/>
+        <p:txBody>
+          <a:bodyPr/>
+          <a:lstStyle/>
+          <a:p>
+            <a:r>
+              <a:rPr lang="en-US" dirty="0"/>
+              <a:t>Training data Statistics</a:t>
+            </a:r>
+            <a:endParaRPr lang="en-IN" dirty="0"/>
+          </a:p>
+        </p:txBody>
+      </p:sp>
+      <p:sp>
+        <p:nvSpPr>
+          <p:cNvPr id="3" name="Content Placeholder 2">
+            <a:extLst>
+              <a:ext uri="{FF2B5EF4-FFF2-40B4-BE49-F238E27FC236}">
+                <a16:creationId xmlns:a16="http://schemas.microsoft.com/office/drawing/2014/main" id="{BEC0F2B5-A1A1-DFCF-ED26-43C971FCC02B}"/>
+              </a:ext>
+            </a:extLst>
+          </p:cNvPr>
+          <p:cNvSpPr>
+            <a:spLocks noGrp="1"/>
+          </p:cNvSpPr>
+          <p:nvPr>
+            <p:ph sz="half" idx="1"/>
+          </p:nvPr>
+        </p:nvSpPr>
+        <p:spPr/>
+        <p:txBody>
+          <a:bodyPr/>
+          <a:lstStyle/>
+          <a:p>
+            <a:r>
+              <a:rPr lang="en-US" dirty="0"/>
+              <a:t>Train split: 80%</a:t>
+            </a:r>
+          </a:p>
+          <a:p>
+            <a:pPr lvl="1"/>
+            <a:r>
+              <a:rPr lang="en-US" dirty="0"/>
+              <a:t>Number of users: 200948</a:t>
+            </a:r>
+          </a:p>
+          <a:p>
+            <a:pPr lvl="1"/>
+            <a:r>
+              <a:rPr lang="en-US" dirty="0"/>
+              <a:t>Number of movies: 80185</a:t>
+            </a:r>
+          </a:p>
+          <a:p>
+            <a:r>
+              <a:rPr lang="en-US" dirty="0"/>
+              <a:t>Ratings are skewed</a:t>
+            </a:r>
+          </a:p>
+          <a:p>
+            <a:endParaRPr lang="en-US" dirty="0"/>
+          </a:p>
+          <a:p>
+            <a:endParaRPr lang="en-IN" dirty="0"/>
+          </a:p>
+        </p:txBody>
+      </p:sp>
+      <p:pic>
+        <p:nvPicPr>
+          <p:cNvPr id="6" name="Content Placeholder 5">
+            <a:extLst>
+              <a:ext uri="{FF2B5EF4-FFF2-40B4-BE49-F238E27FC236}">
+                <a16:creationId xmlns:a16="http://schemas.microsoft.com/office/drawing/2014/main" id="{03AA4319-E0E6-9ECC-EFB3-A1E281A11ADB}"/>
+              </a:ext>
+            </a:extLst>
+          </p:cNvPr>
+          <p:cNvPicPr>
+            <a:picLocks noGrp="1" noChangeAspect="1"/>
+          </p:cNvPicPr>
+          <p:nvPr>
+            <p:ph sz="half" idx="2"/>
+          </p:nvPr>
+        </p:nvPicPr>
+        <p:blipFill>
+          <a:blip r:embed="rId2"/>
+          <a:stretch>
+            <a:fillRect/>
+          </a:stretch>
+        </p:blipFill>
+        <p:spPr>
+          <a:xfrm>
+            <a:off x="6219825" y="1829594"/>
+            <a:ext cx="5086350" cy="4343400"/>
+          </a:xfrm>
+        </p:spPr>
+      </p:pic>
+    </p:spTree>
+    <p:extLst>
+      <p:ext uri="{BB962C8B-B14F-4D97-AF65-F5344CB8AC3E}">
+        <p14:creationId xmlns:p14="http://schemas.microsoft.com/office/powerpoint/2010/main" val="565087166"/>
+      </p:ext>
+    </p:extLst>
+  </p:cSld>
+  <p:clrMapOvr>
+    <a:masterClrMapping/>
+  </p:clrMapOvr>
+</p:sld>
+</file>
+
+<file path=ppt/slides/slide5.xml><?xml version="1.0" encoding="utf-8"?>
+<p:sld xmlns:a="http://schemas.openxmlformats.org/drawingml/2006/main" xmlns:r="http://schemas.openxmlformats.org/officeDocument/2006/relationships" xmlns:p="http://schemas.openxmlformats.org/presentationml/2006/main">
+  <p:cSld>
+    <p:bg>
+      <p:bgPr>
+        <a:solidFill>
+          <a:schemeClr val="bg1"/>
+        </a:solidFill>
+        <a:effectLst/>
+      </p:bgPr>
+    </p:bg>
+    <p:spTree>
+      <p:nvGrpSpPr>
+        <p:cNvPr id="1" name=""/>
+        <p:cNvGrpSpPr/>
+        <p:nvPr/>
+      </p:nvGrpSpPr>
+      <p:grpSpPr>
+        <a:xfrm>
+          <a:off x="0" y="0"/>
+          <a:ext cx="0" cy="0"/>
+          <a:chOff x="0" y="0"/>
+          <a:chExt cx="0" cy="0"/>
+        </a:xfrm>
+      </p:grpSpPr>
+      <p:sp useBgFill="1">
+        <p:nvSpPr>
+          <p:cNvPr id="18" name="Rectangle 17">
+            <a:extLst>
+              <a:ext uri="{FF2B5EF4-FFF2-40B4-BE49-F238E27FC236}">
+                <a16:creationId xmlns:a16="http://schemas.microsoft.com/office/drawing/2014/main" id="{0D7B6173-1D58-48E2-83CF-37350F315F75}"/>
+              </a:ext>
+              <a:ext uri="{C183D7F6-B498-43B3-948B-1728B52AA6E4}">
+                <adec:decorative xmlns:adec="http://schemas.microsoft.com/office/drawing/2017/decorative" val="1"/>
+              </a:ext>
+            </a:extLst>
+          </p:cNvPr>
+          <p:cNvSpPr>
+            <a:spLocks noGrp="1" noRot="1" noChangeAspect="1" noMove="1" noResize="1" noEditPoints="1" noAdjustHandles="1" noChangeArrowheads="1" noChangeShapeType="1" noTextEdit="1"/>
+          </p:cNvSpPr>
+          <p:nvPr>
+            <p:extLst>
+              <p:ext uri="{386F3935-93C4-4BCD-93E2-E3B085C9AB24}">
+                <p16:designElem xmlns:p16="http://schemas.microsoft.com/office/powerpoint/2015/main" val="1"/>
+              </p:ext>
+            </p:extLst>
+          </p:nvPr>
+        </p:nvSpPr>
+        <p:spPr>
+          <a:xfrm>
+            <a:off x="0" y="-1"/>
+            <a:ext cx="12188952" cy="6858000"/>
+          </a:xfrm>
+          <a:prstGeom prst="rect">
+            <a:avLst/>
+          </a:prstGeom>
+          <a:ln>
+            <a:noFill/>
+          </a:ln>
+        </p:spPr>
+        <p:style>
+          <a:lnRef idx="2">
+            <a:schemeClr val="accent1">
+              <a:shade val="50000"/>
+            </a:schemeClr>
+          </a:lnRef>
+          <a:fillRef idx="1">
+            <a:schemeClr val="accent1"/>
+          </a:fillRef>
+          <a:effectRef idx="0">
+            <a:schemeClr val="accent1"/>
+          </a:effectRef>
+          <a:fontRef idx="minor">
+            <a:schemeClr val="lt1"/>
+          </a:fontRef>
+        </p:style>
+        <p:txBody>
+          <a:bodyPr rtlCol="0" anchor="ctr"/>
+          <a:lstStyle/>
+          <a:p>
+            <a:pPr algn="ctr"/>
+            <a:endParaRPr lang="en-US"/>
+          </a:p>
+        </p:txBody>
+      </p:sp>
+      <p:sp>
+        <p:nvSpPr>
+          <p:cNvPr id="20" name="Rectangle 19">
+            <a:extLst>
+              <a:ext uri="{FF2B5EF4-FFF2-40B4-BE49-F238E27FC236}">
+                <a16:creationId xmlns:a16="http://schemas.microsoft.com/office/drawing/2014/main" id="{35D813D1-BA6B-40B4-A101-04BB89445561}"/>
+              </a:ext>
+              <a:ext uri="{C183D7F6-B498-43B3-948B-1728B52AA6E4}">
+                <adec:decorative xmlns:adec="http://schemas.microsoft.com/office/drawing/2017/decorative" val="1"/>
+              </a:ext>
+            </a:extLst>
+          </p:cNvPr>
+          <p:cNvSpPr>
+            <a:spLocks noGrp="1" noRot="1" noChangeAspect="1" noMove="1" noResize="1" noEditPoints="1" noAdjustHandles="1" noChangeArrowheads="1" noChangeShapeType="1" noTextEdit="1"/>
+          </p:cNvSpPr>
+          <p:nvPr>
+            <p:extLst>
+              <p:ext uri="{386F3935-93C4-4BCD-93E2-E3B085C9AB24}">
+                <p16:designElem xmlns:p16="http://schemas.microsoft.com/office/powerpoint/2015/main" val="1"/>
+              </p:ext>
+            </p:extLst>
+          </p:nvPr>
+        </p:nvSpPr>
+        <p:spPr>
+          <a:xfrm>
+            <a:off x="0" y="0"/>
+            <a:ext cx="12188952" cy="6858000"/>
+          </a:xfrm>
+          <a:prstGeom prst="rect">
+            <a:avLst/>
+          </a:prstGeom>
+          <a:solidFill>
+            <a:schemeClr val="bg2">
+              <a:alpha val="50000"/>
+            </a:schemeClr>
+          </a:solidFill>
+          <a:ln>
+            <a:noFill/>
+          </a:ln>
+        </p:spPr>
+        <p:style>
+          <a:lnRef idx="2">
+            <a:schemeClr val="accent1">
+              <a:shade val="50000"/>
+            </a:schemeClr>
+          </a:lnRef>
+          <a:fillRef idx="1">
+            <a:schemeClr val="accent1"/>
+          </a:fillRef>
+          <a:effectRef idx="0">
+            <a:schemeClr val="accent1"/>
+          </a:effectRef>
+          <a:fontRef idx="minor">
+            <a:schemeClr val="lt1"/>
+          </a:fontRef>
+        </p:style>
+        <p:txBody>
+          <a:bodyPr rtlCol="0" anchor="ctr"/>
+          <a:lstStyle/>
+          <a:p>
+            <a:pPr algn="ctr"/>
+            <a:endParaRPr lang="en-US" dirty="0"/>
+          </a:p>
+        </p:txBody>
+      </p:sp>
+      <p:pic>
+        <p:nvPicPr>
+          <p:cNvPr id="22" name="Picture 21">
+            <a:extLst>
+              <a:ext uri="{FF2B5EF4-FFF2-40B4-BE49-F238E27FC236}">
+                <a16:creationId xmlns:a16="http://schemas.microsoft.com/office/drawing/2014/main" id="{B0DAC8FB-A162-44E3-A606-C855A03A5B09}"/>
+              </a:ext>
+              <a:ext uri="{C183D7F6-B498-43B3-948B-1728B52AA6E4}">
+                <adec:decorative xmlns:adec="http://schemas.microsoft.com/office/drawing/2017/decorative" val="1"/>
+              </a:ext>
+            </a:extLst>
+          </p:cNvPr>
+          <p:cNvPicPr>
+            <a:picLocks noGrp="1" noRot="1" noChangeAspect="1" noMove="1" noResize="1" noEditPoints="1" noAdjustHandles="1" noChangeArrowheads="1" noChangeShapeType="1" noCrop="1"/>
+          </p:cNvPicPr>
+          <p:nvPr>
+            <p:extLst>
+              <p:ext uri="{386F3935-93C4-4BCD-93E2-E3B085C9AB24}">
+                <p16:designElem xmlns:p16="http://schemas.microsoft.com/office/powerpoint/2015/main" val="1"/>
+              </p:ext>
+            </p:extLst>
+          </p:nvPr>
+        </p:nvPicPr>
+        <p:blipFill>
+          <a:blip r:embed="rId2">
+            <a:extLst>
+              <a:ext uri="{28A0092B-C50C-407E-A947-70E740481C1C}">
+                <a14:useLocalDpi xmlns:a14="http://schemas.microsoft.com/office/drawing/2010/main" val="0"/>
+              </a:ext>
+            </a:extLst>
+          </a:blip>
+          <a:stretch>
+            <a:fillRect/>
+          </a:stretch>
+        </p:blipFill>
+        <p:spPr>
+          <a:xfrm>
+            <a:off x="0" y="0"/>
+            <a:ext cx="12188952" cy="6862380"/>
+          </a:xfrm>
+          <a:prstGeom prst="rect">
+            <a:avLst/>
+          </a:prstGeom>
+        </p:spPr>
+      </p:pic>
+      <p:sp>
+        <p:nvSpPr>
+          <p:cNvPr id="24" name="Rectangle 23">
+            <a:extLst>
+              <a:ext uri="{FF2B5EF4-FFF2-40B4-BE49-F238E27FC236}">
+                <a16:creationId xmlns:a16="http://schemas.microsoft.com/office/drawing/2014/main" id="{21BDEC81-16A7-4451-B893-C15000083B77}"/>
+              </a:ext>
+              <a:ext uri="{C183D7F6-B498-43B3-948B-1728B52AA6E4}">
+                <adec:decorative xmlns:adec="http://schemas.microsoft.com/office/drawing/2017/decorative" val="1"/>
+              </a:ext>
+            </a:extLst>
+          </p:cNvPr>
+          <p:cNvSpPr>
+            <a:spLocks noGrp="1" noRot="1" noChangeAspect="1" noMove="1" noResize="1" noEditPoints="1" noAdjustHandles="1" noChangeArrowheads="1" noChangeShapeType="1" noTextEdit="1"/>
+          </p:cNvSpPr>
+          <p:nvPr>
+            <p:extLst>
+              <p:ext uri="{386F3935-93C4-4BCD-93E2-E3B085C9AB24}">
+                <p16:designElem xmlns:p16="http://schemas.microsoft.com/office/powerpoint/2015/main" val="1"/>
+              </p:ext>
+            </p:extLst>
+          </p:nvPr>
+        </p:nvSpPr>
+        <p:spPr>
+          <a:xfrm>
+            <a:off x="0" y="0"/>
+            <a:ext cx="12188952" cy="6858000"/>
+          </a:xfrm>
+          <a:prstGeom prst="rect">
+            <a:avLst/>
+          </a:prstGeom>
+          <a:solidFill>
+            <a:schemeClr val="accent1">
+              <a:alpha val="20000"/>
+            </a:schemeClr>
+          </a:solidFill>
+          <a:ln>
+            <a:noFill/>
+          </a:ln>
+        </p:spPr>
+        <p:style>
+          <a:lnRef idx="2">
+            <a:schemeClr val="accent1">
+              <a:shade val="50000"/>
+            </a:schemeClr>
+          </a:lnRef>
+          <a:fillRef idx="1">
+            <a:schemeClr val="accent1"/>
+          </a:fillRef>
+          <a:effectRef idx="0">
+            <a:schemeClr val="accent1"/>
+          </a:effectRef>
+          <a:fontRef idx="minor">
+            <a:schemeClr val="lt1"/>
+          </a:fontRef>
+        </p:style>
+        <p:txBody>
+          <a:bodyPr rtlCol="0" anchor="ctr"/>
+          <a:lstStyle/>
+          <a:p>
+            <a:pPr algn="ctr"/>
+            <a:endParaRPr lang="en-US" dirty="0"/>
+          </a:p>
+        </p:txBody>
+      </p:sp>
+      <p:sp>
+        <p:nvSpPr>
+          <p:cNvPr id="26" name="Rectangle 25">
+            <a:extLst>
+              <a:ext uri="{FF2B5EF4-FFF2-40B4-BE49-F238E27FC236}">
+                <a16:creationId xmlns:a16="http://schemas.microsoft.com/office/drawing/2014/main" id="{AEA3DFA5-2D7B-4989-8ED7-8321EC114CF1}"/>
+              </a:ext>
+              <a:ext uri="{C183D7F6-B498-43B3-948B-1728B52AA6E4}">
+                <adec:decorative xmlns:adec="http://schemas.microsoft.com/office/drawing/2017/decorative" val="1"/>
+              </a:ext>
+            </a:extLst>
+          </p:cNvPr>
+          <p:cNvSpPr>
+            <a:spLocks noGrp="1" noRot="1" noChangeAspect="1" noMove="1" noResize="1" noEditPoints="1" noAdjustHandles="1" noChangeArrowheads="1" noChangeShapeType="1" noTextEdit="1"/>
+          </p:cNvSpPr>
+          <p:nvPr>
+            <p:extLst>
+              <p:ext uri="{386F3935-93C4-4BCD-93E2-E3B085C9AB24}">
+                <p16:designElem xmlns:p16="http://schemas.microsoft.com/office/powerpoint/2015/main" val="1"/>
+              </p:ext>
+            </p:extLst>
+          </p:nvPr>
+        </p:nvSpPr>
+        <p:spPr>
+          <a:xfrm>
+            <a:off x="536678" y="0"/>
+            <a:ext cx="11145980" cy="6870723"/>
+          </a:xfrm>
+          <a:prstGeom prst="rect">
+            <a:avLst/>
+          </a:prstGeom>
+          <a:solidFill>
+            <a:schemeClr val="bg1"/>
+          </a:solidFill>
+          <a:ln w="34925">
+            <a:noFill/>
+          </a:ln>
+        </p:spPr>
+        <p:style>
+          <a:lnRef idx="2">
+            <a:schemeClr val="accent1">
+              <a:shade val="50000"/>
+            </a:schemeClr>
+          </a:lnRef>
+          <a:fillRef idx="1">
+            <a:schemeClr val="accent1"/>
+          </a:fillRef>
+          <a:effectRef idx="0">
+            <a:schemeClr val="accent1"/>
+          </a:effectRef>
+          <a:fontRef idx="minor">
+            <a:schemeClr val="lt1"/>
+          </a:fontRef>
+        </p:style>
+        <p:txBody>
+          <a:bodyPr rtlCol="0" anchor="ctr"/>
+          <a:lstStyle/>
+          <a:p>
+            <a:pPr algn="ctr"/>
+            <a:endParaRPr lang="en-US" b="1">
+              <a:ln w="22225">
+                <a:solidFill>
+                  <a:schemeClr val="accent2"/>
+                </a:solidFill>
+                <a:prstDash val="solid"/>
+              </a:ln>
+              <a:solidFill>
+                <a:schemeClr val="accent2">
+                  <a:lumMod val="40000"/>
+                  <a:lumOff val="60000"/>
+                </a:schemeClr>
+              </a:solidFill>
+            </a:endParaRPr>
+          </a:p>
+        </p:txBody>
+      </p:sp>
+      <p:sp>
+        <p:nvSpPr>
+          <p:cNvPr id="2" name="Title 1">
+            <a:extLst>
+              <a:ext uri="{FF2B5EF4-FFF2-40B4-BE49-F238E27FC236}">
+                <a16:creationId xmlns:a16="http://schemas.microsoft.com/office/drawing/2014/main" id="{39524DF8-0195-E2DE-97B3-E09C226B27DF}"/>
+              </a:ext>
+            </a:extLst>
+          </p:cNvPr>
+          <p:cNvSpPr>
+            <a:spLocks noGrp="1"/>
+          </p:cNvSpPr>
+          <p:nvPr>
+            <p:ph type="title"/>
+          </p:nvPr>
+        </p:nvSpPr>
+        <p:spPr>
+          <a:xfrm>
+            <a:off x="1191966" y="900622"/>
+            <a:ext cx="3629555" cy="1893524"/>
+          </a:xfrm>
+        </p:spPr>
+        <p:txBody>
+          <a:bodyPr vert="horz" lIns="91440" tIns="45720" rIns="91440" bIns="45720" rtlCol="0" anchor="b">
+            <a:normAutofit/>
+          </a:bodyPr>
+          <a:lstStyle/>
+          <a:p>
+            <a:r>
+              <a:rPr lang="en-US" sz="4100"/>
+              <a:t>Users and Movies Distribution</a:t>
+            </a:r>
+          </a:p>
+        </p:txBody>
+      </p:sp>
+      <p:sp>
+        <p:nvSpPr>
+          <p:cNvPr id="15" name="Content Placeholder 14">
+            <a:extLst>
+              <a:ext uri="{FF2B5EF4-FFF2-40B4-BE49-F238E27FC236}">
+                <a16:creationId xmlns:a16="http://schemas.microsoft.com/office/drawing/2014/main" id="{72691E6F-401E-E376-BF9E-EDD6BC329B42}"/>
+              </a:ext>
+            </a:extLst>
+          </p:cNvPr>
+          <p:cNvSpPr>
+            <a:spLocks noGrp="1"/>
+          </p:cNvSpPr>
+          <p:nvPr>
+            <p:ph sz="half" idx="1"/>
+          </p:nvPr>
+        </p:nvSpPr>
+        <p:spPr>
+          <a:xfrm>
+            <a:off x="1191967" y="2965593"/>
+            <a:ext cx="2937824" cy="2941544"/>
+          </a:xfrm>
+        </p:spPr>
+        <p:txBody>
+          <a:bodyPr vert="horz" lIns="91440" tIns="45720" rIns="91440" bIns="45720" rtlCol="0">
+            <a:normAutofit/>
+          </a:bodyPr>
+          <a:lstStyle/>
+          <a:p>
+            <a:r>
+              <a:rPr lang="en-US" sz="1800" dirty="0"/>
+              <a:t>Long Tail</a:t>
+            </a:r>
+          </a:p>
+          <a:p>
+            <a:r>
+              <a:rPr lang="en-US" sz="1800" dirty="0"/>
+              <a:t>Few users rated many movies</a:t>
+            </a:r>
+          </a:p>
+          <a:p>
+            <a:r>
+              <a:rPr lang="en-US" sz="1800" dirty="0"/>
+              <a:t>Few movies are rated by many users</a:t>
+            </a:r>
+          </a:p>
+        </p:txBody>
+      </p:sp>
+      <p:pic>
+        <p:nvPicPr>
+          <p:cNvPr id="7" name="Content Placeholder 6">
+            <a:extLst>
+              <a:ext uri="{FF2B5EF4-FFF2-40B4-BE49-F238E27FC236}">
+                <a16:creationId xmlns:a16="http://schemas.microsoft.com/office/drawing/2014/main" id="{A4668CBC-1B13-FB1A-DA7B-0FEC41F58291}"/>
+              </a:ext>
+            </a:extLst>
+          </p:cNvPr>
+          <p:cNvPicPr>
+            <a:picLocks noGrp="1" noChangeAspect="1"/>
+          </p:cNvPicPr>
+          <p:nvPr>
+            <p:ph sz="half" idx="2"/>
+          </p:nvPr>
+        </p:nvPicPr>
+        <p:blipFill>
+          <a:blip r:embed="rId3"/>
+          <a:stretch>
+            <a:fillRect/>
+          </a:stretch>
+        </p:blipFill>
+        <p:spPr>
+          <a:xfrm>
+            <a:off x="3912296" y="617248"/>
+            <a:ext cx="7594694" cy="2734088"/>
+          </a:xfrm>
+          <a:prstGeom prst="rect">
+            <a:avLst/>
+          </a:prstGeom>
+        </p:spPr>
+      </p:pic>
+      <p:pic>
+        <p:nvPicPr>
+          <p:cNvPr id="10" name="Content Placeholder 9">
+            <a:extLst>
+              <a:ext uri="{FF2B5EF4-FFF2-40B4-BE49-F238E27FC236}">
+                <a16:creationId xmlns:a16="http://schemas.microsoft.com/office/drawing/2014/main" id="{AA605F8F-DFC5-33C3-9ED5-7ADC94AB3536}"/>
+              </a:ext>
+            </a:extLst>
+          </p:cNvPr>
+          <p:cNvPicPr>
+            <a:picLocks noChangeAspect="1"/>
+          </p:cNvPicPr>
+          <p:nvPr/>
+        </p:nvPicPr>
+        <p:blipFill>
+          <a:blip r:embed="rId4"/>
+          <a:stretch>
+            <a:fillRect/>
+          </a:stretch>
+        </p:blipFill>
+        <p:spPr>
+          <a:xfrm>
+            <a:off x="3915464" y="3498319"/>
+            <a:ext cx="7594695" cy="2715103"/>
+          </a:xfrm>
+          <a:prstGeom prst="rect">
+            <a:avLst/>
+          </a:prstGeom>
+        </p:spPr>
+      </p:pic>
+    </p:spTree>
+    <p:extLst>
+      <p:ext uri="{BB962C8B-B14F-4D97-AF65-F5344CB8AC3E}">
+        <p14:creationId xmlns:p14="http://schemas.microsoft.com/office/powerpoint/2010/main" val="2590388499"/>
+      </p:ext>
+    </p:extLst>
+  </p:cSld>
+  <p:clrMapOvr>
+    <a:masterClrMapping/>
+  </p:clrMapOvr>
+</p:sld>
+</file>
+
+<file path=ppt/slides/slide6.xml><?xml version="1.0" encoding="utf-8"?>
+<p:sld xmlns:a="http://schemas.openxmlformats.org/drawingml/2006/main" xmlns:r="http://schemas.openxmlformats.org/officeDocument/2006/relationships" xmlns:p="http://schemas.openxmlformats.org/presentationml/2006/main">
+  <p:cSld>
+    <p:spTree>
+      <p:nvGrpSpPr>
+        <p:cNvPr id="1" name=""/>
+        <p:cNvGrpSpPr/>
+        <p:nvPr/>
+      </p:nvGrpSpPr>
+      <p:grpSpPr>
+        <a:xfrm>
+          <a:off x="0" y="0"/>
+          <a:ext cx="0" cy="0"/>
+          <a:chOff x="0" y="0"/>
+          <a:chExt cx="0" cy="0"/>
+        </a:xfrm>
+      </p:grpSpPr>
+      <p:sp>
+        <p:nvSpPr>
           <p:cNvPr id="2" name="Title 1">
             <a:extLst>
               <a:ext uri="{FF2B5EF4-FFF2-40B4-BE49-F238E27FC236}">
@@ -3592,11 +4446,7 @@
           <a:p>
             <a:r>
               <a:rPr lang="en-US" dirty="0"/>
-              <a:t>&lt; 0.1% matrix sparsity </a:t>
-            </a:r>
-            <a:r>
-              <a:rPr lang="en-US"/>
-              <a:t>=&gt; content-based filtering</a:t>
+              <a:t>&lt; 0.15% matrix sparsity =&gt; content-based filtering</a:t>
             </a:r>
           </a:p>
           <a:p>
@@ -3608,6 +4458,405 @@
     <p:extLst>
       <p:ext uri="{BB962C8B-B14F-4D97-AF65-F5344CB8AC3E}">
         <p14:creationId xmlns:p14="http://schemas.microsoft.com/office/powerpoint/2010/main" val="4290395750"/>
+      </p:ext>
+    </p:extLst>
+  </p:cSld>
+  <p:clrMapOvr>
+    <a:masterClrMapping/>
+  </p:clrMapOvr>
+</p:sld>
+</file>
+
+<file path=ppt/slides/slide7.xml><?xml version="1.0" encoding="utf-8"?>
+<p:sld xmlns:a="http://schemas.openxmlformats.org/drawingml/2006/main" xmlns:r="http://schemas.openxmlformats.org/officeDocument/2006/relationships" xmlns:p="http://schemas.openxmlformats.org/presentationml/2006/main">
+  <p:cSld>
+    <p:spTree>
+      <p:nvGrpSpPr>
+        <p:cNvPr id="1" name=""/>
+        <p:cNvGrpSpPr/>
+        <p:nvPr/>
+      </p:nvGrpSpPr>
+      <p:grpSpPr>
+        <a:xfrm>
+          <a:off x="0" y="0"/>
+          <a:ext cx="0" cy="0"/>
+          <a:chOff x="0" y="0"/>
+          <a:chExt cx="0" cy="0"/>
+        </a:xfrm>
+      </p:grpSpPr>
+      <p:sp>
+        <p:nvSpPr>
+          <p:cNvPr id="4" name="Title 3">
+            <a:extLst>
+              <a:ext uri="{FF2B5EF4-FFF2-40B4-BE49-F238E27FC236}">
+                <a16:creationId xmlns:a16="http://schemas.microsoft.com/office/drawing/2014/main" id="{EF1D65D6-770B-A793-D2CA-7729AEADA9AE}"/>
+              </a:ext>
+            </a:extLst>
+          </p:cNvPr>
+          <p:cNvSpPr>
+            <a:spLocks noGrp="1"/>
+          </p:cNvSpPr>
+          <p:nvPr>
+            <p:ph type="title"/>
+          </p:nvPr>
+        </p:nvSpPr>
+        <p:spPr/>
+        <p:txBody>
+          <a:bodyPr/>
+          <a:lstStyle/>
+          <a:p>
+            <a:r>
+              <a:rPr lang="en-US" dirty="0"/>
+              <a:t>KNN</a:t>
+            </a:r>
+            <a:endParaRPr lang="en-IN" dirty="0"/>
+          </a:p>
+        </p:txBody>
+      </p:sp>
+      <p:sp>
+        <p:nvSpPr>
+          <p:cNvPr id="5" name="Content Placeholder 4">
+            <a:extLst>
+              <a:ext uri="{FF2B5EF4-FFF2-40B4-BE49-F238E27FC236}">
+                <a16:creationId xmlns:a16="http://schemas.microsoft.com/office/drawing/2014/main" id="{1F3E1E58-48A8-5985-C540-0DDAFA264D6C}"/>
+              </a:ext>
+            </a:extLst>
+          </p:cNvPr>
+          <p:cNvSpPr>
+            <a:spLocks noGrp="1"/>
+          </p:cNvSpPr>
+          <p:nvPr>
+            <p:ph idx="1"/>
+          </p:nvPr>
+        </p:nvSpPr>
+        <p:spPr/>
+        <p:txBody>
+          <a:bodyPr/>
+          <a:lstStyle/>
+          <a:p>
+            <a:r>
+              <a:rPr lang="en-US" dirty="0"/>
+              <a:t>200k users and 84k movies</a:t>
+            </a:r>
+          </a:p>
+          <a:p>
+            <a:r>
+              <a:rPr lang="en-US" dirty="0"/>
+              <a:t>Time complexity for all users: </a:t>
+            </a:r>
+          </a:p>
+          <a:p>
+            <a:pPr lvl="1"/>
+            <a:r>
+              <a:rPr lang="en-US" dirty="0"/>
+              <a:t>O(N^2 x M) = O(3.36 x 10^15) = 38.6 days</a:t>
+            </a:r>
+          </a:p>
+          <a:p>
+            <a:pPr lvl="1"/>
+            <a:r>
+              <a:rPr lang="en-US" dirty="0"/>
+              <a:t>O(M^2 x N) = O(1.41 x 10^11) = 2.38 min</a:t>
+            </a:r>
+          </a:p>
+          <a:p>
+            <a:pPr lvl="1"/>
+            <a:r>
+              <a:rPr lang="en-US" dirty="0"/>
+              <a:t>O(M^2) memory</a:t>
+            </a:r>
+          </a:p>
+          <a:p>
+            <a:pPr lvl="1"/>
+            <a:r>
+              <a:rPr lang="en-US" dirty="0"/>
+              <a:t>Impossible for all users in single run</a:t>
+            </a:r>
+          </a:p>
+          <a:p>
+            <a:r>
+              <a:rPr lang="en-IN" dirty="0"/>
+              <a:t>Dimensional reduction: </a:t>
+            </a:r>
+          </a:p>
+          <a:p>
+            <a:pPr lvl="1"/>
+            <a:r>
+              <a:rPr lang="en-IN" dirty="0"/>
+              <a:t>Not possible</a:t>
+            </a:r>
+          </a:p>
+          <a:p>
+            <a:pPr lvl="1"/>
+            <a:r>
+              <a:rPr lang="en-IN" dirty="0"/>
+              <a:t>Unbearable for even 84k movies</a:t>
+            </a:r>
+          </a:p>
+        </p:txBody>
+      </p:sp>
+    </p:spTree>
+    <p:extLst>
+      <p:ext uri="{BB962C8B-B14F-4D97-AF65-F5344CB8AC3E}">
+        <p14:creationId xmlns:p14="http://schemas.microsoft.com/office/powerpoint/2010/main" val="3821546446"/>
+      </p:ext>
+    </p:extLst>
+  </p:cSld>
+  <p:clrMapOvr>
+    <a:masterClrMapping/>
+  </p:clrMapOvr>
+</p:sld>
+</file>
+
+<file path=ppt/slides/slide8.xml><?xml version="1.0" encoding="utf-8"?>
+<p:sld xmlns:a="http://schemas.openxmlformats.org/drawingml/2006/main" xmlns:r="http://schemas.openxmlformats.org/officeDocument/2006/relationships" xmlns:p="http://schemas.openxmlformats.org/presentationml/2006/main">
+  <p:cSld>
+    <p:spTree>
+      <p:nvGrpSpPr>
+        <p:cNvPr id="1" name=""/>
+        <p:cNvGrpSpPr/>
+        <p:nvPr/>
+      </p:nvGrpSpPr>
+      <p:grpSpPr>
+        <a:xfrm>
+          <a:off x="0" y="0"/>
+          <a:ext cx="0" cy="0"/>
+          <a:chOff x="0" y="0"/>
+          <a:chExt cx="0" cy="0"/>
+        </a:xfrm>
+      </p:grpSpPr>
+      <p:sp>
+        <p:nvSpPr>
+          <p:cNvPr id="2" name="Title 1">
+            <a:extLst>
+              <a:ext uri="{FF2B5EF4-FFF2-40B4-BE49-F238E27FC236}">
+                <a16:creationId xmlns:a16="http://schemas.microsoft.com/office/drawing/2014/main" id="{EB1AB2AF-A13B-B48F-3C78-F0AD0D621319}"/>
+              </a:ext>
+            </a:extLst>
+          </p:cNvPr>
+          <p:cNvSpPr>
+            <a:spLocks noGrp="1"/>
+          </p:cNvSpPr>
+          <p:nvPr>
+            <p:ph type="title"/>
+          </p:nvPr>
+        </p:nvSpPr>
+        <p:spPr/>
+        <p:txBody>
+          <a:bodyPr/>
+          <a:lstStyle/>
+          <a:p>
+            <a:r>
+              <a:rPr lang="en-IN" dirty="0"/>
+              <a:t>KNN Dimensional Reduction</a:t>
+            </a:r>
+          </a:p>
+        </p:txBody>
+      </p:sp>
+      <p:sp>
+        <p:nvSpPr>
+          <p:cNvPr id="3" name="Content Placeholder 2">
+            <a:extLst>
+              <a:ext uri="{FF2B5EF4-FFF2-40B4-BE49-F238E27FC236}">
+                <a16:creationId xmlns:a16="http://schemas.microsoft.com/office/drawing/2014/main" id="{64CF3540-1321-F32C-987B-6308641E7602}"/>
+              </a:ext>
+            </a:extLst>
+          </p:cNvPr>
+          <p:cNvSpPr>
+            <a:spLocks noGrp="1"/>
+          </p:cNvSpPr>
+          <p:nvPr>
+            <p:ph idx="1"/>
+          </p:nvPr>
+        </p:nvSpPr>
+        <p:spPr/>
+        <p:txBody>
+          <a:bodyPr>
+            <a:normAutofit fontScale="92500" lnSpcReduction="20000"/>
+          </a:bodyPr>
+          <a:lstStyle/>
+          <a:p>
+            <a:r>
+              <a:rPr lang="en-IN" dirty="0"/>
+              <a:t>K-D trees</a:t>
+            </a:r>
+          </a:p>
+          <a:p>
+            <a:pPr lvl="1"/>
+            <a:r>
+              <a:rPr lang="en-IN" dirty="0"/>
+              <a:t>Low dimensional and real-valued</a:t>
+            </a:r>
+          </a:p>
+          <a:p>
+            <a:pPr lvl="1"/>
+            <a:r>
+              <a:rPr lang="en-IN" dirty="0"/>
+              <a:t>O(M log2N), when M &lt;&lt; N</a:t>
+            </a:r>
+          </a:p>
+          <a:p>
+            <a:pPr lvl="1"/>
+            <a:r>
+              <a:rPr lang="en-IN" dirty="0"/>
+              <a:t>Can miss neighbours</a:t>
+            </a:r>
+          </a:p>
+          <a:p>
+            <a:r>
+              <a:rPr lang="en-IN" dirty="0"/>
+              <a:t>Inverted lists</a:t>
+            </a:r>
+          </a:p>
+          <a:p>
+            <a:pPr lvl="1"/>
+            <a:r>
+              <a:rPr lang="en-IN" dirty="0"/>
+              <a:t>High dimensional, sparse data</a:t>
+            </a:r>
+          </a:p>
+          <a:p>
+            <a:pPr lvl="1"/>
+            <a:r>
+              <a:rPr lang="en-IN" dirty="0"/>
+              <a:t>O(N’M’), where N’ &lt;&lt; N, M’ &lt;&lt; M</a:t>
+            </a:r>
+          </a:p>
+          <a:p>
+            <a:pPr lvl="1"/>
+            <a:r>
+              <a:rPr lang="en-IN" dirty="0"/>
+              <a:t>Exact</a:t>
+            </a:r>
+          </a:p>
+          <a:p>
+            <a:r>
+              <a:rPr lang="en-IN" dirty="0"/>
+              <a:t>Locality-sensitive hashing</a:t>
+            </a:r>
+          </a:p>
+          <a:p>
+            <a:pPr lvl="1"/>
+            <a:r>
+              <a:rPr lang="en-IN" dirty="0"/>
+              <a:t>High-d, real-valued </a:t>
+            </a:r>
+            <a:r>
+              <a:rPr lang="en-IN"/>
+              <a:t>or discrete</a:t>
+            </a:r>
+            <a:endParaRPr lang="en-IN" dirty="0"/>
+          </a:p>
+          <a:p>
+            <a:pPr lvl="1"/>
+            <a:r>
+              <a:rPr lang="en-IN" dirty="0"/>
+              <a:t>O(N’M), N’ &lt;&lt; N</a:t>
+            </a:r>
+          </a:p>
+          <a:p>
+            <a:pPr lvl="1"/>
+            <a:r>
+              <a:rPr lang="en-IN" dirty="0"/>
+              <a:t>Bits in fingerprint</a:t>
+            </a:r>
+          </a:p>
+          <a:p>
+            <a:pPr lvl="1"/>
+            <a:r>
+              <a:rPr lang="en-IN" dirty="0"/>
+              <a:t>Can miss neighbours</a:t>
+            </a:r>
+          </a:p>
+        </p:txBody>
+      </p:sp>
+    </p:spTree>
+    <p:extLst>
+      <p:ext uri="{BB962C8B-B14F-4D97-AF65-F5344CB8AC3E}">
+        <p14:creationId xmlns:p14="http://schemas.microsoft.com/office/powerpoint/2010/main" val="3000351803"/>
+      </p:ext>
+    </p:extLst>
+  </p:cSld>
+  <p:clrMapOvr>
+    <a:masterClrMapping/>
+  </p:clrMapOvr>
+</p:sld>
+</file>
+
+<file path=ppt/slides/slide9.xml><?xml version="1.0" encoding="utf-8"?>
+<p:sld xmlns:a="http://schemas.openxmlformats.org/drawingml/2006/main" xmlns:r="http://schemas.openxmlformats.org/officeDocument/2006/relationships" xmlns:p="http://schemas.openxmlformats.org/presentationml/2006/main">
+  <p:cSld>
+    <p:spTree>
+      <p:nvGrpSpPr>
+        <p:cNvPr id="1" name=""/>
+        <p:cNvGrpSpPr/>
+        <p:nvPr/>
+      </p:nvGrpSpPr>
+      <p:grpSpPr>
+        <a:xfrm>
+          <a:off x="0" y="0"/>
+          <a:ext cx="0" cy="0"/>
+          <a:chOff x="0" y="0"/>
+          <a:chExt cx="0" cy="0"/>
+        </a:xfrm>
+      </p:grpSpPr>
+      <p:sp>
+        <p:nvSpPr>
+          <p:cNvPr id="2" name="Title 1">
+            <a:extLst>
+              <a:ext uri="{FF2B5EF4-FFF2-40B4-BE49-F238E27FC236}">
+                <a16:creationId xmlns:a16="http://schemas.microsoft.com/office/drawing/2014/main" id="{B3B41975-8563-0532-66D2-1E3169A33C88}"/>
+              </a:ext>
+            </a:extLst>
+          </p:cNvPr>
+          <p:cNvSpPr>
+            <a:spLocks noGrp="1"/>
+          </p:cNvSpPr>
+          <p:nvPr>
+            <p:ph type="title"/>
+          </p:nvPr>
+        </p:nvSpPr>
+        <p:spPr/>
+        <p:txBody>
+          <a:bodyPr/>
+          <a:lstStyle/>
+          <a:p>
+            <a:r>
+              <a:rPr lang="en-IN" dirty="0"/>
+              <a:t>ALS</a:t>
+            </a:r>
+          </a:p>
+        </p:txBody>
+      </p:sp>
+      <p:sp>
+        <p:nvSpPr>
+          <p:cNvPr id="3" name="Content Placeholder 2">
+            <a:extLst>
+              <a:ext uri="{FF2B5EF4-FFF2-40B4-BE49-F238E27FC236}">
+                <a16:creationId xmlns:a16="http://schemas.microsoft.com/office/drawing/2014/main" id="{A702A13A-7C27-123E-4E5F-69F4037658D0}"/>
+              </a:ext>
+            </a:extLst>
+          </p:cNvPr>
+          <p:cNvSpPr>
+            <a:spLocks noGrp="1"/>
+          </p:cNvSpPr>
+          <p:nvPr>
+            <p:ph idx="1"/>
+          </p:nvPr>
+        </p:nvSpPr>
+        <p:spPr/>
+        <p:txBody>
+          <a:bodyPr/>
+          <a:lstStyle/>
+          <a:p>
+            <a:endParaRPr lang="en-IN" dirty="0"/>
+          </a:p>
+        </p:txBody>
+      </p:sp>
+    </p:spTree>
+    <p:extLst>
+      <p:ext uri="{BB962C8B-B14F-4D97-AF65-F5344CB8AC3E}">
+        <p14:creationId xmlns:p14="http://schemas.microsoft.com/office/powerpoint/2010/main" val="1805196466"/>
       </p:ext>
     </p:extLst>
   </p:cSld>

</xml_diff>